<commit_message>
Updated 'roles and technologies' diagram
</commit_message>
<xml_diff>
--- a/doc/diagrams/RolesAndTechnologies.pptx
+++ b/doc/diagrams/RolesAndTechnologies.pptx
@@ -192,7 +192,7 @@
           <a:p>
             <a:fld id="{EB56B9F1-9881-483D-AC17-B3C6E9A32E68}" type="datetimeFigureOut">
               <a:rPr lang="en-SG" smtClean="0"/>
-              <a:t>18/5/2013</a:t>
+              <a:t>6/5/2014</a:t>
             </a:fld>
             <a:endParaRPr lang="en-SG"/>
           </a:p>
@@ -731,7 +731,7 @@
             <a:fld id="{1D8BD707-D9CF-40AE-B4C6-C98DA3205C09}" type="datetimeFigureOut">
               <a:rPr lang="en-US" smtClean="0"/>
               <a:pPr/>
-              <a:t>5/18/2013</a:t>
+              <a:t>5/6/2014</a:t>
             </a:fld>
             <a:endParaRPr lang="en-US"/>
           </a:p>
@@ -898,7 +898,7 @@
             <a:fld id="{1D8BD707-D9CF-40AE-B4C6-C98DA3205C09}" type="datetimeFigureOut">
               <a:rPr lang="en-US" smtClean="0"/>
               <a:pPr/>
-              <a:t>5/18/2013</a:t>
+              <a:t>5/6/2014</a:t>
             </a:fld>
             <a:endParaRPr lang="en-US"/>
           </a:p>
@@ -1075,7 +1075,7 @@
             <a:fld id="{1D8BD707-D9CF-40AE-B4C6-C98DA3205C09}" type="datetimeFigureOut">
               <a:rPr lang="en-US" smtClean="0"/>
               <a:pPr/>
-              <a:t>5/18/2013</a:t>
+              <a:t>5/6/2014</a:t>
             </a:fld>
             <a:endParaRPr lang="en-US"/>
           </a:p>
@@ -1242,7 +1242,7 @@
             <a:fld id="{1D8BD707-D9CF-40AE-B4C6-C98DA3205C09}" type="datetimeFigureOut">
               <a:rPr lang="en-US" smtClean="0"/>
               <a:pPr/>
-              <a:t>5/18/2013</a:t>
+              <a:t>5/6/2014</a:t>
             </a:fld>
             <a:endParaRPr lang="en-US"/>
           </a:p>
@@ -1485,7 +1485,7 @@
             <a:fld id="{1D8BD707-D9CF-40AE-B4C6-C98DA3205C09}" type="datetimeFigureOut">
               <a:rPr lang="en-US" smtClean="0"/>
               <a:pPr/>
-              <a:t>5/18/2013</a:t>
+              <a:t>5/6/2014</a:t>
             </a:fld>
             <a:endParaRPr lang="en-US"/>
           </a:p>
@@ -1770,7 +1770,7 @@
             <a:fld id="{1D8BD707-D9CF-40AE-B4C6-C98DA3205C09}" type="datetimeFigureOut">
               <a:rPr lang="en-US" smtClean="0"/>
               <a:pPr/>
-              <a:t>5/18/2013</a:t>
+              <a:t>5/6/2014</a:t>
             </a:fld>
             <a:endParaRPr lang="en-US"/>
           </a:p>
@@ -2189,7 +2189,7 @@
             <a:fld id="{1D8BD707-D9CF-40AE-B4C6-C98DA3205C09}" type="datetimeFigureOut">
               <a:rPr lang="en-US" smtClean="0"/>
               <a:pPr/>
-              <a:t>5/18/2013</a:t>
+              <a:t>5/6/2014</a:t>
             </a:fld>
             <a:endParaRPr lang="en-US"/>
           </a:p>
@@ -2304,7 +2304,7 @@
             <a:fld id="{1D8BD707-D9CF-40AE-B4C6-C98DA3205C09}" type="datetimeFigureOut">
               <a:rPr lang="en-US" smtClean="0"/>
               <a:pPr/>
-              <a:t>5/18/2013</a:t>
+              <a:t>5/6/2014</a:t>
             </a:fld>
             <a:endParaRPr lang="en-US"/>
           </a:p>
@@ -2396,7 +2396,7 @@
             <a:fld id="{1D8BD707-D9CF-40AE-B4C6-C98DA3205C09}" type="datetimeFigureOut">
               <a:rPr lang="en-US" smtClean="0"/>
               <a:pPr/>
-              <a:t>5/18/2013</a:t>
+              <a:t>5/6/2014</a:t>
             </a:fld>
             <a:endParaRPr lang="en-US"/>
           </a:p>
@@ -2670,7 +2670,7 @@
             <a:fld id="{1D8BD707-D9CF-40AE-B4C6-C98DA3205C09}" type="datetimeFigureOut">
               <a:rPr lang="en-US" smtClean="0"/>
               <a:pPr/>
-              <a:t>5/18/2013</a:t>
+              <a:t>5/6/2014</a:t>
             </a:fld>
             <a:endParaRPr lang="en-US"/>
           </a:p>
@@ -2920,7 +2920,7 @@
             <a:fld id="{1D8BD707-D9CF-40AE-B4C6-C98DA3205C09}" type="datetimeFigureOut">
               <a:rPr lang="en-US" smtClean="0"/>
               <a:pPr/>
-              <a:t>5/18/2013</a:t>
+              <a:t>5/6/2014</a:t>
             </a:fld>
             <a:endParaRPr lang="en-US"/>
           </a:p>
@@ -3130,7 +3130,7 @@
             <a:fld id="{1D8BD707-D9CF-40AE-B4C6-C98DA3205C09}" type="datetimeFigureOut">
               <a:rPr lang="en-US" smtClean="0"/>
               <a:pPr/>
-              <a:t>5/18/2013</a:t>
+              <a:t>5/6/2014</a:t>
             </a:fld>
             <a:endParaRPr lang="en-US"/>
           </a:p>
@@ -4090,7 +4090,17 @@
                 <a:latin typeface="Consolas" pitchFamily="49" charset="0"/>
                 <a:cs typeface="Consolas" pitchFamily="49" charset="0"/>
               </a:rPr>
-              <a:t>          Hg</a:t>
+              <a:t>          </a:t>
+            </a:r>
+            <a:r>
+              <a:rPr lang="en-US" sz="1400" b="1" dirty="0" err="1" smtClean="0">
+                <a:solidFill>
+                  <a:schemeClr val="tx1"/>
+                </a:solidFill>
+                <a:latin typeface="Consolas" pitchFamily="49" charset="0"/>
+                <a:cs typeface="Consolas" pitchFamily="49" charset="0"/>
+              </a:rPr>
+              <a:t>Git</a:t>
             </a:r>
             <a:endParaRPr lang="en-SG" sz="1400" b="1" dirty="0">
               <a:solidFill>
@@ -4675,6 +4685,67 @@
           </a:fontRef>
         </p:style>
       </p:cxnSp>
+      <p:sp>
+        <p:nvSpPr>
+          <p:cNvPr id="20" name="Rounded Rectangle 19"/>
+          <p:cNvSpPr/>
+          <p:nvPr/>
+        </p:nvSpPr>
+        <p:spPr>
+          <a:xfrm>
+            <a:off x="201475" y="639945"/>
+            <a:ext cx="1044850" cy="1388594"/>
+          </a:xfrm>
+          <a:prstGeom prst="roundRect">
+            <a:avLst>
+              <a:gd name="adj" fmla="val 9190"/>
+            </a:avLst>
+          </a:prstGeom>
+          <a:noFill/>
+          <a:ln>
+            <a:noFill/>
+          </a:ln>
+        </p:spPr>
+        <p:style>
+          <a:lnRef idx="2">
+            <a:schemeClr val="accent1">
+              <a:shade val="50000"/>
+            </a:schemeClr>
+          </a:lnRef>
+          <a:fillRef idx="1">
+            <a:schemeClr val="accent1"/>
+          </a:fillRef>
+          <a:effectRef idx="0">
+            <a:schemeClr val="accent1"/>
+          </a:effectRef>
+          <a:fontRef idx="minor">
+            <a:schemeClr val="lt1"/>
+          </a:fontRef>
+        </p:style>
+        <p:txBody>
+          <a:bodyPr vert="horz" rtlCol="0" anchor="t" anchorCtr="0"/>
+          <a:lstStyle/>
+          <a:p>
+            <a:r>
+              <a:rPr lang="en-US" sz="1400" b="1" dirty="0" smtClean="0">
+                <a:solidFill>
+                  <a:schemeClr val="tx1"/>
+                </a:solidFill>
+                <a:latin typeface="Consolas" pitchFamily="49" charset="0"/>
+                <a:cs typeface="Consolas" pitchFamily="49" charset="0"/>
+              </a:rPr>
+              <a:t>English</a:t>
+            </a:r>
+            <a:endParaRPr lang="en-SG" sz="1400" b="1" dirty="0">
+              <a:solidFill>
+                <a:schemeClr val="tx1"/>
+              </a:solidFill>
+              <a:latin typeface="Consolas" pitchFamily="49" charset="0"/>
+              <a:cs typeface="Consolas" pitchFamily="49" charset="0"/>
+            </a:endParaRPr>
+          </a:p>
+        </p:txBody>
+      </p:sp>
     </p:spTree>
     <p:extLst>
       <p:ext uri="{BB962C8B-B14F-4D97-AF65-F5344CB8AC3E}">

</xml_diff>

<commit_message>
Modify .md and .pptx files to mention jstl
</commit_message>
<xml_diff>
--- a/doc/diagrams/RolesAndTechnologies.pptx
+++ b/doc/diagrams/RolesAndTechnologies.pptx
@@ -107,6 +107,22 @@
       </a:defRPr>
     </a:lvl9pPr>
   </p:defaultTextStyle>
+  <p:extLst>
+    <p:ext uri="{EFAFB233-063F-42B5-8137-9DF3F51BA10A}">
+      <p15:sldGuideLst xmlns:p15="http://schemas.microsoft.com/office/powerpoint/2012/main">
+        <p15:guide id="1" orient="horz" pos="817">
+          <p15:clr>
+            <a:srgbClr val="A4A3A4"/>
+          </p15:clr>
+        </p15:guide>
+        <p15:guide id="2" pos="2382">
+          <p15:clr>
+            <a:srgbClr val="A4A3A4"/>
+          </p15:clr>
+        </p15:guide>
+      </p15:sldGuideLst>
+    </p:ext>
+  </p:extLst>
 </p:presentation>
 </file>
 
@@ -192,7 +208,7 @@
           <a:p>
             <a:fld id="{EB56B9F1-9881-483D-AC17-B3C6E9A32E68}" type="datetimeFigureOut">
               <a:rPr lang="en-SG" smtClean="0"/>
-              <a:t>6/5/2014</a:t>
+              <a:t>5/8/2015</a:t>
             </a:fld>
             <a:endParaRPr lang="en-SG"/>
           </a:p>
@@ -731,7 +747,7 @@
             <a:fld id="{1D8BD707-D9CF-40AE-B4C6-C98DA3205C09}" type="datetimeFigureOut">
               <a:rPr lang="en-US" smtClean="0"/>
               <a:pPr/>
-              <a:t>5/6/2014</a:t>
+              <a:t>8/5/2015</a:t>
             </a:fld>
             <a:endParaRPr lang="en-US"/>
           </a:p>
@@ -898,7 +914,7 @@
             <a:fld id="{1D8BD707-D9CF-40AE-B4C6-C98DA3205C09}" type="datetimeFigureOut">
               <a:rPr lang="en-US" smtClean="0"/>
               <a:pPr/>
-              <a:t>5/6/2014</a:t>
+              <a:t>8/5/2015</a:t>
             </a:fld>
             <a:endParaRPr lang="en-US"/>
           </a:p>
@@ -1075,7 +1091,7 @@
             <a:fld id="{1D8BD707-D9CF-40AE-B4C6-C98DA3205C09}" type="datetimeFigureOut">
               <a:rPr lang="en-US" smtClean="0"/>
               <a:pPr/>
-              <a:t>5/6/2014</a:t>
+              <a:t>8/5/2015</a:t>
             </a:fld>
             <a:endParaRPr lang="en-US"/>
           </a:p>
@@ -1242,7 +1258,7 @@
             <a:fld id="{1D8BD707-D9CF-40AE-B4C6-C98DA3205C09}" type="datetimeFigureOut">
               <a:rPr lang="en-US" smtClean="0"/>
               <a:pPr/>
-              <a:t>5/6/2014</a:t>
+              <a:t>8/5/2015</a:t>
             </a:fld>
             <a:endParaRPr lang="en-US"/>
           </a:p>
@@ -1485,7 +1501,7 @@
             <a:fld id="{1D8BD707-D9CF-40AE-B4C6-C98DA3205C09}" type="datetimeFigureOut">
               <a:rPr lang="en-US" smtClean="0"/>
               <a:pPr/>
-              <a:t>5/6/2014</a:t>
+              <a:t>8/5/2015</a:t>
             </a:fld>
             <a:endParaRPr lang="en-US"/>
           </a:p>
@@ -1770,7 +1786,7 @@
             <a:fld id="{1D8BD707-D9CF-40AE-B4C6-C98DA3205C09}" type="datetimeFigureOut">
               <a:rPr lang="en-US" smtClean="0"/>
               <a:pPr/>
-              <a:t>5/6/2014</a:t>
+              <a:t>8/5/2015</a:t>
             </a:fld>
             <a:endParaRPr lang="en-US"/>
           </a:p>
@@ -2189,7 +2205,7 @@
             <a:fld id="{1D8BD707-D9CF-40AE-B4C6-C98DA3205C09}" type="datetimeFigureOut">
               <a:rPr lang="en-US" smtClean="0"/>
               <a:pPr/>
-              <a:t>5/6/2014</a:t>
+              <a:t>8/5/2015</a:t>
             </a:fld>
             <a:endParaRPr lang="en-US"/>
           </a:p>
@@ -2304,7 +2320,7 @@
             <a:fld id="{1D8BD707-D9CF-40AE-B4C6-C98DA3205C09}" type="datetimeFigureOut">
               <a:rPr lang="en-US" smtClean="0"/>
               <a:pPr/>
-              <a:t>5/6/2014</a:t>
+              <a:t>8/5/2015</a:t>
             </a:fld>
             <a:endParaRPr lang="en-US"/>
           </a:p>
@@ -2396,7 +2412,7 @@
             <a:fld id="{1D8BD707-D9CF-40AE-B4C6-C98DA3205C09}" type="datetimeFigureOut">
               <a:rPr lang="en-US" smtClean="0"/>
               <a:pPr/>
-              <a:t>5/6/2014</a:t>
+              <a:t>8/5/2015</a:t>
             </a:fld>
             <a:endParaRPr lang="en-US"/>
           </a:p>
@@ -2670,7 +2686,7 @@
             <a:fld id="{1D8BD707-D9CF-40AE-B4C6-C98DA3205C09}" type="datetimeFigureOut">
               <a:rPr lang="en-US" smtClean="0"/>
               <a:pPr/>
-              <a:t>5/6/2014</a:t>
+              <a:t>8/5/2015</a:t>
             </a:fld>
             <a:endParaRPr lang="en-US"/>
           </a:p>
@@ -2920,7 +2936,7 @@
             <a:fld id="{1D8BD707-D9CF-40AE-B4C6-C98DA3205C09}" type="datetimeFigureOut">
               <a:rPr lang="en-US" smtClean="0"/>
               <a:pPr/>
-              <a:t>5/6/2014</a:t>
+              <a:t>8/5/2015</a:t>
             </a:fld>
             <a:endParaRPr lang="en-US"/>
           </a:p>
@@ -3130,7 +3146,7 @@
             <a:fld id="{1D8BD707-D9CF-40AE-B4C6-C98DA3205C09}" type="datetimeFigureOut">
               <a:rPr lang="en-US" smtClean="0"/>
               <a:pPr/>
-              <a:t>5/6/2014</a:t>
+              <a:t>8/5/2015</a:t>
             </a:fld>
             <a:endParaRPr lang="en-US"/>
           </a:p>
@@ -4225,14 +4241,14 @@
               <a:t>HTML, CSS, JavaScript, JSP, </a:t>
             </a:r>
             <a:r>
-              <a:rPr lang="en-US" sz="1400" b="1" dirty="0" err="1" smtClean="0">
+              <a:rPr lang="en-US" sz="1400" b="1" smtClean="0">
                 <a:solidFill>
                   <a:schemeClr val="tx1"/>
                 </a:solidFill>
                 <a:latin typeface="Consolas" pitchFamily="49" charset="0"/>
                 <a:cs typeface="Consolas" pitchFamily="49" charset="0"/>
               </a:rPr>
-              <a:t>JQuery</a:t>
+              <a:t>JSTL, JQuery</a:t>
             </a:r>
             <a:r>
               <a:rPr lang="en-US" sz="1400" b="1" dirty="0" smtClean="0">

</xml_diff>